<commit_message>
regex to extract label
</commit_message>
<xml_diff>
--- a/sample_output/sample1.pptx
+++ b/sample_output/sample1.pptx
@@ -3182,7 +3182,42 @@
       <p:grpSpPr/>
       <p:sp>
         <p:nvSpPr>
-          <p:cNvPr id="2" name="Rectangle 1"/>
+          <p:cNvPr id="2" name="TextBox 1"/>
+          <p:cNvSpPr txBox="1"/>
+          <p:nvPr/>
+        </p:nvSpPr>
+        <p:spPr>
+          <a:xfrm>
+            <a:off x="121920" y="137160"/>
+            <a:ext cx="11582400" cy="342900"/>
+          </a:xfrm>
+          <a:prstGeom prst="rect">
+            <a:avLst/>
+          </a:prstGeom>
+          <a:noFill/>
+        </p:spPr>
+        <p:txBody>
+          <a:bodyPr wrap="square" anchor="t">
+            <a:spAutoFit/>
+          </a:bodyPr>
+          <a:lstStyle/>
+          <a:p>
+            <a:pPr algn="l"/>
+            <a:r>
+              <a:rPr sz="3000" b="1" i="0" u="none">
+                <a:solidFill>
+                  <a:srgbClr val="404040"/>
+                </a:solidFill>
+                <a:latin typeface="Meiryo"/>
+              </a:rPr>
+              <a:t>test</a:t>
+            </a:r>
+          </a:p>
+        </p:txBody>
+      </p:sp>
+      <p:sp>
+        <p:nvSpPr>
+          <p:cNvPr id="3" name="Rectangle 2"/>
           <p:cNvSpPr/>
           <p:nvPr/>
         </p:nvSpPr>
@@ -3234,98 +3269,9 @@
           </a:p>
         </p:txBody>
       </p:sp>
-      <p:sp>
-        <p:nvSpPr>
-          <p:cNvPr id="3" name="TextBox 2"/>
-          <p:cNvSpPr txBox="1"/>
-          <p:nvPr/>
-        </p:nvSpPr>
-        <p:spPr>
-          <a:xfrm>
-            <a:off x="121920" y="137160"/>
-            <a:ext cx="11582400" cy="342900"/>
-          </a:xfrm>
-          <a:prstGeom prst="rect">
-            <a:avLst/>
-          </a:prstGeom>
-          <a:noFill/>
-        </p:spPr>
-        <p:txBody>
-          <a:bodyPr wrap="square" anchor="t">
-            <a:spAutoFit/>
-          </a:bodyPr>
-          <a:lstStyle/>
-          <a:p>
-            <a:pPr algn="l"/>
-            <a:r>
-              <a:rPr sz="3000" b="1" i="0" u="none">
-                <a:solidFill>
-                  <a:srgbClr val="404040"/>
-                </a:solidFill>
-                <a:latin typeface="Meiryo"/>
-              </a:rPr>
-              <a:t>test</a:t>
-            </a:r>
-          </a:p>
-        </p:txBody>
-      </p:sp>
-      <p:sp>
-        <p:nvSpPr>
-          <p:cNvPr id="4" name="Rectangle 3"/>
-          <p:cNvSpPr/>
-          <p:nvPr/>
-        </p:nvSpPr>
-        <p:spPr>
-          <a:xfrm>
-            <a:off x="0" y="685800"/>
-            <a:ext cx="12192000" cy="137160"/>
-          </a:xfrm>
-          <a:prstGeom prst="rect">
-            <a:avLst/>
-          </a:prstGeom>
-          <a:gradFill rotWithShape="1">
-            <a:gsLst>
-              <a:gs pos="0">
-                <a:srgbClr val="E0E5F7"/>
-              </a:gs>
-              <a:gs pos="100000">
-                <a:srgbClr val="95ABEA"/>
-              </a:gs>
-            </a:gsLst>
-            <a:lin scaled="0" ang="0"/>
-          </a:gradFill>
-          <a:ln w="1">
-            <a:solidFill>
-              <a:srgbClr val="FFFFFF"/>
-            </a:solidFill>
-          </a:ln>
-          <a:effectLst/>
-        </p:spPr>
-        <p:style>
-          <a:lnRef idx="1">
-            <a:schemeClr val="accent1"/>
-          </a:lnRef>
-          <a:fillRef idx="3">
-            <a:schemeClr val="accent1"/>
-          </a:fillRef>
-          <a:effectRef idx="2">
-            <a:schemeClr val="accent1"/>
-          </a:effectRef>
-          <a:fontRef idx="minor">
-            <a:schemeClr val="lt1"/>
-          </a:fontRef>
-        </p:style>
-        <p:txBody>
-          <a:bodyPr rtlCol="0" anchor="ctr"/>
-          <a:lstStyle/>
-          <a:p>
-            <a:pPr algn="ctr"/>
-          </a:p>
-        </p:txBody>
-      </p:sp>
       <p:pic>
         <p:nvPicPr>
-          <p:cNvPr id="5" name="Picture 4" descr="01_Slide1.png"/>
+          <p:cNvPr id="4" name="Picture 3" descr="01_Slide1.png"/>
           <p:cNvPicPr>
             <a:picLocks noChangeAspect="1"/>
           </p:cNvPicPr>
@@ -3349,7 +3295,7 @@
       </p:pic>
       <p:sp>
         <p:nvSpPr>
-          <p:cNvPr id="6" name="TextBox 5"/>
+          <p:cNvPr id="5" name="TextBox 4"/>
           <p:cNvSpPr txBox="1"/>
           <p:nvPr/>
         </p:nvSpPr>
@@ -3384,7 +3330,7 @@
       </p:sp>
       <p:pic>
         <p:nvPicPr>
-          <p:cNvPr id="7" name="Picture 6" descr="02_Slide2.png"/>
+          <p:cNvPr id="6" name="Picture 5" descr="02_Slide2.png"/>
           <p:cNvPicPr>
             <a:picLocks noChangeAspect="1"/>
           </p:cNvPicPr>
@@ -3408,7 +3354,7 @@
       </p:pic>
       <p:sp>
         <p:nvSpPr>
-          <p:cNvPr id="8" name="TextBox 7"/>
+          <p:cNvPr id="7" name="TextBox 6"/>
           <p:cNvSpPr txBox="1"/>
           <p:nvPr/>
         </p:nvSpPr>
@@ -3443,7 +3389,7 @@
       </p:sp>
       <p:pic>
         <p:nvPicPr>
-          <p:cNvPr id="9" name="Picture 8" descr="03_Slide3.png"/>
+          <p:cNvPr id="8" name="Picture 7" descr="03_Slide3.png"/>
           <p:cNvPicPr>
             <a:picLocks noChangeAspect="1"/>
           </p:cNvPicPr>
@@ -3467,7 +3413,7 @@
       </p:pic>
       <p:sp>
         <p:nvSpPr>
-          <p:cNvPr id="10" name="TextBox 9"/>
+          <p:cNvPr id="9" name="TextBox 8"/>
           <p:cNvSpPr txBox="1"/>
           <p:nvPr/>
         </p:nvSpPr>
@@ -3502,7 +3448,7 @@
       </p:sp>
       <p:pic>
         <p:nvPicPr>
-          <p:cNvPr id="11" name="Picture 10" descr="04_Slide4.png"/>
+          <p:cNvPr id="10" name="Picture 9" descr="04_Slide4.png"/>
           <p:cNvPicPr>
             <a:picLocks noChangeAspect="1"/>
           </p:cNvPicPr>
@@ -3526,7 +3472,7 @@
       </p:pic>
       <p:sp>
         <p:nvSpPr>
-          <p:cNvPr id="12" name="TextBox 11"/>
+          <p:cNvPr id="11" name="TextBox 10"/>
           <p:cNvSpPr txBox="1"/>
           <p:nvPr/>
         </p:nvSpPr>
@@ -3561,7 +3507,7 @@
       </p:sp>
       <p:pic>
         <p:nvPicPr>
-          <p:cNvPr id="13" name="Picture 12" descr="05_Slide5.png"/>
+          <p:cNvPr id="12" name="Picture 11" descr="05_Slide5.png"/>
           <p:cNvPicPr>
             <a:picLocks noChangeAspect="1"/>
           </p:cNvPicPr>
@@ -3585,7 +3531,7 @@
       </p:pic>
       <p:sp>
         <p:nvSpPr>
-          <p:cNvPr id="14" name="TextBox 13"/>
+          <p:cNvPr id="13" name="TextBox 12"/>
           <p:cNvSpPr txBox="1"/>
           <p:nvPr/>
         </p:nvSpPr>
@@ -3620,7 +3566,7 @@
       </p:sp>
       <p:pic>
         <p:nvPicPr>
-          <p:cNvPr id="15" name="Picture 14" descr="06_Slide6.png"/>
+          <p:cNvPr id="14" name="Picture 13" descr="06_Slide6.png"/>
           <p:cNvPicPr>
             <a:picLocks noChangeAspect="1"/>
           </p:cNvPicPr>
@@ -3644,7 +3590,7 @@
       </p:pic>
       <p:sp>
         <p:nvSpPr>
-          <p:cNvPr id="16" name="TextBox 15"/>
+          <p:cNvPr id="15" name="TextBox 14"/>
           <p:cNvSpPr txBox="1"/>
           <p:nvPr/>
         </p:nvSpPr>
@@ -3679,7 +3625,7 @@
       </p:sp>
       <p:pic>
         <p:nvPicPr>
-          <p:cNvPr id="17" name="Picture 16" descr="07_Slide7.png"/>
+          <p:cNvPr id="16" name="Picture 15" descr="07_Slide7.png"/>
           <p:cNvPicPr>
             <a:picLocks noChangeAspect="1"/>
           </p:cNvPicPr>
@@ -3703,7 +3649,7 @@
       </p:pic>
       <p:sp>
         <p:nvSpPr>
-          <p:cNvPr id="18" name="TextBox 17"/>
+          <p:cNvPr id="17" name="TextBox 16"/>
           <p:cNvSpPr txBox="1"/>
           <p:nvPr/>
         </p:nvSpPr>
@@ -3738,7 +3684,7 @@
       </p:sp>
       <p:pic>
         <p:nvPicPr>
-          <p:cNvPr id="19" name="Picture 18" descr="08_Slide8.png"/>
+          <p:cNvPr id="18" name="Picture 17" descr="08_Slide8.png"/>
           <p:cNvPicPr>
             <a:picLocks noChangeAspect="1"/>
           </p:cNvPicPr>
@@ -3762,7 +3708,7 @@
       </p:pic>
       <p:sp>
         <p:nvSpPr>
-          <p:cNvPr id="20" name="TextBox 19"/>
+          <p:cNvPr id="19" name="TextBox 18"/>
           <p:cNvSpPr txBox="1"/>
           <p:nvPr/>
         </p:nvSpPr>
@@ -3815,7 +3761,42 @@
       <p:grpSpPr/>
       <p:sp>
         <p:nvSpPr>
-          <p:cNvPr id="2" name="Rectangle 1"/>
+          <p:cNvPr id="2" name="TextBox 1"/>
+          <p:cNvSpPr txBox="1"/>
+          <p:nvPr/>
+        </p:nvSpPr>
+        <p:spPr>
+          <a:xfrm>
+            <a:off x="121920" y="137160"/>
+            <a:ext cx="11582400" cy="342900"/>
+          </a:xfrm>
+          <a:prstGeom prst="rect">
+            <a:avLst/>
+          </a:prstGeom>
+          <a:noFill/>
+        </p:spPr>
+        <p:txBody>
+          <a:bodyPr wrap="square" anchor="t">
+            <a:spAutoFit/>
+          </a:bodyPr>
+          <a:lstStyle/>
+          <a:p>
+            <a:pPr algn="l"/>
+            <a:r>
+              <a:rPr sz="3000" b="1" i="0" u="none">
+                <a:solidFill>
+                  <a:srgbClr val="404040"/>
+                </a:solidFill>
+                <a:latin typeface="Meiryo"/>
+              </a:rPr>
+              <a:t>test2</a:t>
+            </a:r>
+          </a:p>
+        </p:txBody>
+      </p:sp>
+      <p:sp>
+        <p:nvSpPr>
+          <p:cNvPr id="3" name="Rectangle 2"/>
           <p:cNvSpPr/>
           <p:nvPr/>
         </p:nvSpPr>
@@ -3867,98 +3848,9 @@
           </a:p>
         </p:txBody>
       </p:sp>
-      <p:sp>
-        <p:nvSpPr>
-          <p:cNvPr id="3" name="TextBox 2"/>
-          <p:cNvSpPr txBox="1"/>
-          <p:nvPr/>
-        </p:nvSpPr>
-        <p:spPr>
-          <a:xfrm>
-            <a:off x="121920" y="137160"/>
-            <a:ext cx="11582400" cy="342900"/>
-          </a:xfrm>
-          <a:prstGeom prst="rect">
-            <a:avLst/>
-          </a:prstGeom>
-          <a:noFill/>
-        </p:spPr>
-        <p:txBody>
-          <a:bodyPr wrap="square" anchor="t">
-            <a:spAutoFit/>
-          </a:bodyPr>
-          <a:lstStyle/>
-          <a:p>
-            <a:pPr algn="l"/>
-            <a:r>
-              <a:rPr sz="3000" b="1" i="0" u="none">
-                <a:solidFill>
-                  <a:srgbClr val="404040"/>
-                </a:solidFill>
-                <a:latin typeface="Meiryo"/>
-              </a:rPr>
-              <a:t>test2</a:t>
-            </a:r>
-          </a:p>
-        </p:txBody>
-      </p:sp>
-      <p:sp>
-        <p:nvSpPr>
-          <p:cNvPr id="4" name="Rectangle 3"/>
-          <p:cNvSpPr/>
-          <p:nvPr/>
-        </p:nvSpPr>
-        <p:spPr>
-          <a:xfrm>
-            <a:off x="0" y="685800"/>
-            <a:ext cx="12192000" cy="137160"/>
-          </a:xfrm>
-          <a:prstGeom prst="rect">
-            <a:avLst/>
-          </a:prstGeom>
-          <a:gradFill rotWithShape="1">
-            <a:gsLst>
-              <a:gs pos="0">
-                <a:srgbClr val="E0E5F7"/>
-              </a:gs>
-              <a:gs pos="100000">
-                <a:srgbClr val="95ABEA"/>
-              </a:gs>
-            </a:gsLst>
-            <a:lin scaled="0" ang="0"/>
-          </a:gradFill>
-          <a:ln w="1">
-            <a:solidFill>
-              <a:srgbClr val="FFFFFF"/>
-            </a:solidFill>
-          </a:ln>
-          <a:effectLst/>
-        </p:spPr>
-        <p:style>
-          <a:lnRef idx="1">
-            <a:schemeClr val="accent1"/>
-          </a:lnRef>
-          <a:fillRef idx="3">
-            <a:schemeClr val="accent1"/>
-          </a:fillRef>
-          <a:effectRef idx="2">
-            <a:schemeClr val="accent1"/>
-          </a:effectRef>
-          <a:fontRef idx="minor">
-            <a:schemeClr val="lt1"/>
-          </a:fontRef>
-        </p:style>
-        <p:txBody>
-          <a:bodyPr rtlCol="0" anchor="ctr"/>
-          <a:lstStyle/>
-          <a:p>
-            <a:pPr algn="ctr"/>
-          </a:p>
-        </p:txBody>
-      </p:sp>
       <p:pic>
         <p:nvPicPr>
-          <p:cNvPr id="5" name="Picture 4" descr="05_Slide5.png"/>
+          <p:cNvPr id="4" name="Picture 3" descr="05_Slide5.png"/>
           <p:cNvPicPr>
             <a:picLocks noChangeAspect="1"/>
           </p:cNvPicPr>
@@ -3982,7 +3874,7 @@
       </p:pic>
       <p:sp>
         <p:nvSpPr>
-          <p:cNvPr id="6" name="TextBox 5"/>
+          <p:cNvPr id="5" name="TextBox 4"/>
           <p:cNvSpPr txBox="1"/>
           <p:nvPr/>
         </p:nvSpPr>
@@ -4017,7 +3909,7 @@
       </p:sp>
       <p:pic>
         <p:nvPicPr>
-          <p:cNvPr id="7" name="Picture 6" descr="06_Slide6.png"/>
+          <p:cNvPr id="6" name="Picture 5" descr="06_Slide6.png"/>
           <p:cNvPicPr>
             <a:picLocks noChangeAspect="1"/>
           </p:cNvPicPr>
@@ -4041,7 +3933,7 @@
       </p:pic>
       <p:sp>
         <p:nvSpPr>
-          <p:cNvPr id="8" name="TextBox 7"/>
+          <p:cNvPr id="7" name="TextBox 6"/>
           <p:cNvSpPr txBox="1"/>
           <p:nvPr/>
         </p:nvSpPr>
@@ -4076,7 +3968,7 @@
       </p:sp>
       <p:pic>
         <p:nvPicPr>
-          <p:cNvPr id="9" name="Picture 8" descr="07_Slide7.png"/>
+          <p:cNvPr id="8" name="Picture 7" descr="07_Slide7.png"/>
           <p:cNvPicPr>
             <a:picLocks noChangeAspect="1"/>
           </p:cNvPicPr>
@@ -4100,7 +3992,7 @@
       </p:pic>
       <p:sp>
         <p:nvSpPr>
-          <p:cNvPr id="10" name="TextBox 9"/>
+          <p:cNvPr id="9" name="TextBox 8"/>
           <p:cNvSpPr txBox="1"/>
           <p:nvPr/>
         </p:nvSpPr>
@@ -4135,7 +4027,7 @@
       </p:sp>
       <p:pic>
         <p:nvPicPr>
-          <p:cNvPr id="11" name="Picture 10" descr="08_Slide8.png"/>
+          <p:cNvPr id="10" name="Picture 9" descr="08_Slide8.png"/>
           <p:cNvPicPr>
             <a:picLocks noChangeAspect="1"/>
           </p:cNvPicPr>
@@ -4159,7 +4051,7 @@
       </p:pic>
       <p:sp>
         <p:nvSpPr>
-          <p:cNvPr id="12" name="TextBox 11"/>
+          <p:cNvPr id="11" name="TextBox 10"/>
           <p:cNvSpPr txBox="1"/>
           <p:nvPr/>
         </p:nvSpPr>
@@ -4212,7 +4104,42 @@
       <p:grpSpPr/>
       <p:sp>
         <p:nvSpPr>
-          <p:cNvPr id="2" name="Rectangle 1"/>
+          <p:cNvPr id="2" name="TextBox 1"/>
+          <p:cNvSpPr txBox="1"/>
+          <p:nvPr/>
+        </p:nvSpPr>
+        <p:spPr>
+          <a:xfrm>
+            <a:off x="121920" y="137160"/>
+            <a:ext cx="11582400" cy="342900"/>
+          </a:xfrm>
+          <a:prstGeom prst="rect">
+            <a:avLst/>
+          </a:prstGeom>
+          <a:noFill/>
+        </p:spPr>
+        <p:txBody>
+          <a:bodyPr wrap="square" anchor="t">
+            <a:spAutoFit/>
+          </a:bodyPr>
+          <a:lstStyle/>
+          <a:p>
+            <a:pPr algn="l"/>
+            <a:r>
+              <a:rPr sz="3000" b="1" i="0" u="none">
+                <a:solidFill>
+                  <a:srgbClr val="404040"/>
+                </a:solidFill>
+                <a:latin typeface="Meiryo"/>
+              </a:rPr>
+              <a:t>test</a:t>
+            </a:r>
+          </a:p>
+        </p:txBody>
+      </p:sp>
+      <p:sp>
+        <p:nvSpPr>
+          <p:cNvPr id="3" name="Rectangle 2"/>
           <p:cNvSpPr/>
           <p:nvPr/>
         </p:nvSpPr>
@@ -4264,98 +4191,9 @@
           </a:p>
         </p:txBody>
       </p:sp>
-      <p:sp>
-        <p:nvSpPr>
-          <p:cNvPr id="3" name="TextBox 2"/>
-          <p:cNvSpPr txBox="1"/>
-          <p:nvPr/>
-        </p:nvSpPr>
-        <p:spPr>
-          <a:xfrm>
-            <a:off x="121920" y="137160"/>
-            <a:ext cx="11582400" cy="342900"/>
-          </a:xfrm>
-          <a:prstGeom prst="rect">
-            <a:avLst/>
-          </a:prstGeom>
-          <a:noFill/>
-        </p:spPr>
-        <p:txBody>
-          <a:bodyPr wrap="square" anchor="t">
-            <a:spAutoFit/>
-          </a:bodyPr>
-          <a:lstStyle/>
-          <a:p>
-            <a:pPr algn="l"/>
-            <a:r>
-              <a:rPr sz="3000" b="1" i="0" u="none">
-                <a:solidFill>
-                  <a:srgbClr val="404040"/>
-                </a:solidFill>
-                <a:latin typeface="Meiryo"/>
-              </a:rPr>
-              <a:t>test</a:t>
-            </a:r>
-          </a:p>
-        </p:txBody>
-      </p:sp>
-      <p:sp>
-        <p:nvSpPr>
-          <p:cNvPr id="4" name="Rectangle 3"/>
-          <p:cNvSpPr/>
-          <p:nvPr/>
-        </p:nvSpPr>
-        <p:spPr>
-          <a:xfrm>
-            <a:off x="0" y="685800"/>
-            <a:ext cx="12192000" cy="137160"/>
-          </a:xfrm>
-          <a:prstGeom prst="rect">
-            <a:avLst/>
-          </a:prstGeom>
-          <a:gradFill rotWithShape="1">
-            <a:gsLst>
-              <a:gs pos="0">
-                <a:srgbClr val="E0E5F7"/>
-              </a:gs>
-              <a:gs pos="100000">
-                <a:srgbClr val="95ABEA"/>
-              </a:gs>
-            </a:gsLst>
-            <a:lin scaled="0" ang="0"/>
-          </a:gradFill>
-          <a:ln w="1">
-            <a:solidFill>
-              <a:srgbClr val="FFFFFF"/>
-            </a:solidFill>
-          </a:ln>
-          <a:effectLst/>
-        </p:spPr>
-        <p:style>
-          <a:lnRef idx="1">
-            <a:schemeClr val="accent1"/>
-          </a:lnRef>
-          <a:fillRef idx="3">
-            <a:schemeClr val="accent1"/>
-          </a:fillRef>
-          <a:effectRef idx="2">
-            <a:schemeClr val="accent1"/>
-          </a:effectRef>
-          <a:fontRef idx="minor">
-            <a:schemeClr val="lt1"/>
-          </a:fontRef>
-        </p:style>
-        <p:txBody>
-          <a:bodyPr rtlCol="0" anchor="ctr"/>
-          <a:lstStyle/>
-          <a:p>
-            <a:pPr algn="ctr"/>
-          </a:p>
-        </p:txBody>
-      </p:sp>
       <p:pic>
         <p:nvPicPr>
-          <p:cNvPr id="5" name="Picture 4" descr="01_Slide1.png"/>
+          <p:cNvPr id="4" name="Picture 3" descr="01_Slide1.png"/>
           <p:cNvPicPr>
             <a:picLocks noChangeAspect="1"/>
           </p:cNvPicPr>
@@ -4379,7 +4217,7 @@
       </p:pic>
       <p:pic>
         <p:nvPicPr>
-          <p:cNvPr id="6" name="Picture 5" descr="02_Slide2.png"/>
+          <p:cNvPr id="5" name="Picture 4" descr="02_Slide2.png"/>
           <p:cNvPicPr>
             <a:picLocks noChangeAspect="1"/>
           </p:cNvPicPr>
@@ -4403,7 +4241,7 @@
       </p:pic>
       <p:pic>
         <p:nvPicPr>
-          <p:cNvPr id="7" name="Picture 6" descr="03_Slide3.png"/>
+          <p:cNvPr id="6" name="Picture 5" descr="03_Slide3.png"/>
           <p:cNvPicPr>
             <a:picLocks noChangeAspect="1"/>
           </p:cNvPicPr>
@@ -4427,7 +4265,7 @@
       </p:pic>
       <p:pic>
         <p:nvPicPr>
-          <p:cNvPr id="8" name="Picture 7" descr="04_Slide4.png"/>
+          <p:cNvPr id="7" name="Picture 6" descr="04_Slide4.png"/>
           <p:cNvPicPr>
             <a:picLocks noChangeAspect="1"/>
           </p:cNvPicPr>
@@ -4451,7 +4289,7 @@
       </p:pic>
       <p:pic>
         <p:nvPicPr>
-          <p:cNvPr id="9" name="Picture 8" descr="05_Slide5.png"/>
+          <p:cNvPr id="8" name="Picture 7" descr="05_Slide5.png"/>
           <p:cNvPicPr>
             <a:picLocks noChangeAspect="1"/>
           </p:cNvPicPr>
@@ -4475,7 +4313,7 @@
       </p:pic>
       <p:pic>
         <p:nvPicPr>
-          <p:cNvPr id="10" name="Picture 9" descr="06_Slide6.png"/>
+          <p:cNvPr id="9" name="Picture 8" descr="06_Slide6.png"/>
           <p:cNvPicPr>
             <a:picLocks noChangeAspect="1"/>
           </p:cNvPicPr>
@@ -4499,7 +4337,7 @@
       </p:pic>
       <p:pic>
         <p:nvPicPr>
-          <p:cNvPr id="11" name="Picture 10" descr="07_Slide7.png"/>
+          <p:cNvPr id="10" name="Picture 9" descr="07_Slide7.png"/>
           <p:cNvPicPr>
             <a:picLocks noChangeAspect="1"/>
           </p:cNvPicPr>
@@ -4523,7 +4361,7 @@
       </p:pic>
       <p:pic>
         <p:nvPicPr>
-          <p:cNvPr id="12" name="Picture 11" descr="08_Slide8.png"/>
+          <p:cNvPr id="11" name="Picture 10" descr="08_Slide8.png"/>
           <p:cNvPicPr>
             <a:picLocks noChangeAspect="1"/>
           </p:cNvPicPr>
@@ -4565,7 +4403,42 @@
       <p:grpSpPr/>
       <p:sp>
         <p:nvSpPr>
-          <p:cNvPr id="2" name="Rectangle 1"/>
+          <p:cNvPr id="2" name="TextBox 1"/>
+          <p:cNvSpPr txBox="1"/>
+          <p:nvPr/>
+        </p:nvSpPr>
+        <p:spPr>
+          <a:xfrm>
+            <a:off x="121920" y="137160"/>
+            <a:ext cx="11582400" cy="342900"/>
+          </a:xfrm>
+          <a:prstGeom prst="rect">
+            <a:avLst/>
+          </a:prstGeom>
+          <a:noFill/>
+        </p:spPr>
+        <p:txBody>
+          <a:bodyPr wrap="square" anchor="t">
+            <a:spAutoFit/>
+          </a:bodyPr>
+          <a:lstStyle/>
+          <a:p>
+            <a:pPr algn="l"/>
+            <a:r>
+              <a:rPr sz="3000" b="1" i="0" u="none">
+                <a:solidFill>
+                  <a:srgbClr val="404040"/>
+                </a:solidFill>
+                <a:latin typeface="Meiryo"/>
+              </a:rPr>
+              <a:t>test2</a:t>
+            </a:r>
+          </a:p>
+        </p:txBody>
+      </p:sp>
+      <p:sp>
+        <p:nvSpPr>
+          <p:cNvPr id="3" name="Rectangle 2"/>
           <p:cNvSpPr/>
           <p:nvPr/>
         </p:nvSpPr>
@@ -4617,98 +4490,9 @@
           </a:p>
         </p:txBody>
       </p:sp>
-      <p:sp>
-        <p:nvSpPr>
-          <p:cNvPr id="3" name="TextBox 2"/>
-          <p:cNvSpPr txBox="1"/>
-          <p:nvPr/>
-        </p:nvSpPr>
-        <p:spPr>
-          <a:xfrm>
-            <a:off x="121920" y="137160"/>
-            <a:ext cx="11582400" cy="342900"/>
-          </a:xfrm>
-          <a:prstGeom prst="rect">
-            <a:avLst/>
-          </a:prstGeom>
-          <a:noFill/>
-        </p:spPr>
-        <p:txBody>
-          <a:bodyPr wrap="square" anchor="t">
-            <a:spAutoFit/>
-          </a:bodyPr>
-          <a:lstStyle/>
-          <a:p>
-            <a:pPr algn="l"/>
-            <a:r>
-              <a:rPr sz="3000" b="1" i="0" u="none">
-                <a:solidFill>
-                  <a:srgbClr val="404040"/>
-                </a:solidFill>
-                <a:latin typeface="Meiryo"/>
-              </a:rPr>
-              <a:t>test2</a:t>
-            </a:r>
-          </a:p>
-        </p:txBody>
-      </p:sp>
-      <p:sp>
-        <p:nvSpPr>
-          <p:cNvPr id="4" name="Rectangle 3"/>
-          <p:cNvSpPr/>
-          <p:nvPr/>
-        </p:nvSpPr>
-        <p:spPr>
-          <a:xfrm>
-            <a:off x="0" y="685800"/>
-            <a:ext cx="12192000" cy="137160"/>
-          </a:xfrm>
-          <a:prstGeom prst="rect">
-            <a:avLst/>
-          </a:prstGeom>
-          <a:gradFill rotWithShape="1">
-            <a:gsLst>
-              <a:gs pos="0">
-                <a:srgbClr val="E0E5F7"/>
-              </a:gs>
-              <a:gs pos="100000">
-                <a:srgbClr val="95ABEA"/>
-              </a:gs>
-            </a:gsLst>
-            <a:lin scaled="0" ang="0"/>
-          </a:gradFill>
-          <a:ln w="1">
-            <a:solidFill>
-              <a:srgbClr val="FFFFFF"/>
-            </a:solidFill>
-          </a:ln>
-          <a:effectLst/>
-        </p:spPr>
-        <p:style>
-          <a:lnRef idx="1">
-            <a:schemeClr val="accent1"/>
-          </a:lnRef>
-          <a:fillRef idx="3">
-            <a:schemeClr val="accent1"/>
-          </a:fillRef>
-          <a:effectRef idx="2">
-            <a:schemeClr val="accent1"/>
-          </a:effectRef>
-          <a:fontRef idx="minor">
-            <a:schemeClr val="lt1"/>
-          </a:fontRef>
-        </p:style>
-        <p:txBody>
-          <a:bodyPr rtlCol="0" anchor="ctr"/>
-          <a:lstStyle/>
-          <a:p>
-            <a:pPr algn="ctr"/>
-          </a:p>
-        </p:txBody>
-      </p:sp>
       <p:pic>
         <p:nvPicPr>
-          <p:cNvPr id="5" name="Picture 4" descr="05_Slide5.png"/>
+          <p:cNvPr id="4" name="Picture 3" descr="05_Slide5.png"/>
           <p:cNvPicPr>
             <a:picLocks noChangeAspect="1"/>
           </p:cNvPicPr>
@@ -4732,7 +4516,7 @@
       </p:pic>
       <p:pic>
         <p:nvPicPr>
-          <p:cNvPr id="6" name="Picture 5" descr="06_Slide6.png"/>
+          <p:cNvPr id="5" name="Picture 4" descr="06_Slide6.png"/>
           <p:cNvPicPr>
             <a:picLocks noChangeAspect="1"/>
           </p:cNvPicPr>
@@ -4756,7 +4540,7 @@
       </p:pic>
       <p:pic>
         <p:nvPicPr>
-          <p:cNvPr id="7" name="Picture 6" descr="07_Slide7.png"/>
+          <p:cNvPr id="6" name="Picture 5" descr="07_Slide7.png"/>
           <p:cNvPicPr>
             <a:picLocks noChangeAspect="1"/>
           </p:cNvPicPr>
@@ -4780,7 +4564,7 @@
       </p:pic>
       <p:pic>
         <p:nvPicPr>
-          <p:cNvPr id="8" name="Picture 7" descr="08_Slide8.png"/>
+          <p:cNvPr id="7" name="Picture 6" descr="08_Slide8.png"/>
           <p:cNvPicPr>
             <a:picLocks noChangeAspect="1"/>
           </p:cNvPicPr>

</xml_diff>